<commit_message>
update sdk content overview
- add VS Code as IDE
- Add Commercial Component license in Central Repository
- Keep Abstraction Layer Implementations only on Github repositories
</commit_message>
<xml_diff>
--- a/SDK6UserGuide/images/sdk_6_content.pptx
+++ b/SDK6UserGuide/images/sdk_6_content.pptx
@@ -218,7 +218,7 @@
               <a:rPr lang="fr-FR" smtClean="0">
                 <a:latin typeface="Calibri Regular" charset="0"/>
               </a:rPr>
-              <a:t>vendredi 27 octobre 2023</a:t>
+              <a:t>mardi 22 avril 2025</a:t>
             </a:fld>
             <a:endParaRPr lang="en-US" dirty="0">
               <a:latin typeface="Calibri Regular" charset="0"/>
@@ -396,7 +396,7 @@
           <a:p>
             <a:fld id="{885721CF-495B-2B41-A23A-4D3221F80235}" type="datetime2">
               <a:rPr lang="fr-FR" smtClean="0"/>
-              <a:t>vendredi 27 octobre 2023</a:t>
+              <a:t>mardi 22 avril 2025</a:t>
             </a:fld>
             <a:endParaRPr lang="en-US" dirty="0"/>
           </a:p>
@@ -9857,7 +9857,7 @@
         </p:blipFill>
         <p:spPr bwMode="auto">
           <a:xfrm>
-            <a:off x="1834910" y="3402308"/>
+            <a:off x="737772" y="3292886"/>
             <a:ext cx="762103" cy="762103"/>
           </a:xfrm>
           <a:prstGeom prst="rect">
@@ -9891,7 +9891,7 @@
         </p:blipFill>
         <p:spPr>
           <a:xfrm>
-            <a:off x="1036770" y="4473065"/>
+            <a:off x="1655528" y="4360321"/>
             <a:ext cx="990807" cy="231833"/>
           </a:xfrm>
           <a:prstGeom prst="rect">
@@ -10149,6 +10149,9 @@
             </a:lvl1pPr>
           </a:lstStyle>
           <a:p>
+            <a:endParaRPr lang="en-US" dirty="0"/>
+          </a:p>
+          <a:p>
             <a:r>
               <a:rPr lang="en-US" dirty="0"/>
               <a:t>Packs</a:t>
@@ -10166,12 +10169,6 @@
               <a:t>Add-On Libraries</a:t>
             </a:r>
             <a:endParaRPr lang="en-US" b="1" dirty="0"/>
-          </a:p>
-          <a:p>
-            <a:r>
-              <a:rPr lang="en-US" dirty="0"/>
-              <a:t>Abstraction Layer Implementations</a:t>
-            </a:r>
           </a:p>
           <a:p>
             <a:r>
@@ -10316,7 +10313,7 @@
         <p:spPr>
           <a:xfrm>
             <a:off x="8895062" y="1775667"/>
-            <a:ext cx="2423178" cy="400110"/>
+            <a:ext cx="2423178" cy="553998"/>
           </a:xfrm>
           <a:prstGeom prst="rect">
             <a:avLst/>
@@ -10362,7 +10359,32 @@
             </a:r>
             <a:r>
               <a:rPr lang="en-US" i="1" dirty="0"/>
-              <a:t>, Apache, Eclipse, BSD, etc.</a:t>
+              <a:t>, </a:t>
+            </a:r>
+            <a:r>
+              <a:rPr lang="en-US" i="1" dirty="0">
+                <a:solidFill>
+                  <a:schemeClr val="accent1"/>
+                </a:solidFill>
+              </a:rPr>
+              <a:t>Commercial Component</a:t>
+            </a:r>
+          </a:p>
+          <a:p>
+            <a:pPr marL="0" indent="0">
+              <a:buNone/>
+            </a:pPr>
+            <a:r>
+              <a:rPr lang="en-US" i="1" dirty="0">
+                <a:solidFill>
+                  <a:schemeClr val="accent1"/>
+                </a:solidFill>
+              </a:rPr>
+              <a:t> </a:t>
+            </a:r>
+            <a:r>
+              <a:rPr lang="en-US" i="1" dirty="0"/>
+              <a:t>Apache, Eclipse, BSD, etc.</a:t>
             </a:r>
           </a:p>
         </p:txBody>
@@ -10550,7 +10572,7 @@
           <a:p>
             <a:r>
               <a:rPr lang="en-US" dirty="0"/>
-              <a:t>Abstraction Layer Implementations</a:t>
+              <a:t>Third Party C Modules</a:t>
             </a:r>
           </a:p>
           <a:p>
@@ -10568,7 +10590,7 @@
           <a:p>
             <a:r>
               <a:rPr lang="en-US" dirty="0"/>
-              <a:t>Demo Firmware &amp; Virtual Devices</a:t>
+              <a:t>Demo Kernels &amp; Virtual Devices</a:t>
             </a:r>
           </a:p>
         </p:txBody>
@@ -11019,8 +11041,55 @@
         </p:blipFill>
         <p:spPr bwMode="auto">
           <a:xfrm>
-            <a:off x="569722" y="3379136"/>
+            <a:off x="706702" y="3991201"/>
             <a:ext cx="835847" cy="835847"/>
+          </a:xfrm>
+          <a:prstGeom prst="rect">
+            <a:avLst/>
+          </a:prstGeom>
+          <a:noFill/>
+          <a:extLst>
+            <a:ext uri="{909E8E84-426E-40DD-AFC4-6F175D3DCCD1}">
+              <a14:hiddenFill xmlns:a14="http://schemas.microsoft.com/office/drawing/2010/main">
+                <a:solidFill>
+                  <a:srgbClr val="FFFFFF"/>
+                </a:solidFill>
+              </a14:hiddenFill>
+            </a:ext>
+          </a:extLst>
+        </p:spPr>
+      </p:pic>
+      <p:pic>
+        <p:nvPicPr>
+          <p:cNvPr id="3" name="Picture 2">
+            <a:extLst>
+              <a:ext uri="{FF2B5EF4-FFF2-40B4-BE49-F238E27FC236}">
+                <a16:creationId xmlns:a16="http://schemas.microsoft.com/office/drawing/2014/main" id="{F895D3EC-6013-4A9A-34D0-EB3EB4E3DE4A}"/>
+              </a:ext>
+            </a:extLst>
+          </p:cNvPr>
+          <p:cNvPicPr>
+            <a:picLocks noChangeAspect="1" noChangeArrowheads="1"/>
+          </p:cNvPicPr>
+          <p:nvPr/>
+        </p:nvPicPr>
+        <p:blipFill>
+          <a:blip r:embed="rId10" cstate="print">
+            <a:extLst>
+              <a:ext uri="{28A0092B-C50C-407E-A947-70E740481C1C}">
+                <a14:useLocalDpi xmlns:a14="http://schemas.microsoft.com/office/drawing/2010/main" val="0"/>
+              </a:ext>
+            </a:extLst>
+          </a:blip>
+          <a:srcRect/>
+          <a:stretch>
+            <a:fillRect/>
+          </a:stretch>
+        </p:blipFill>
+        <p:spPr bwMode="auto">
+          <a:xfrm>
+            <a:off x="1753019" y="3292886"/>
+            <a:ext cx="762103" cy="762103"/>
           </a:xfrm>
           <a:prstGeom prst="rect">
             <a:avLst/>

</xml_diff>